<commit_message>
Item #371. UPdated Reportes,pptx
</commit_message>
<xml_diff>
--- a/docs/Wireframes/[Backend]Reportes.pptx
+++ b/docs/Wireframes/[Backend]Reportes.pptx
@@ -5,12 +5,13 @@
     <p:sldMasterId id="2147483648" r:id="rId1"/>
   </p:sldMasterIdLst>
   <p:notesMasterIdLst>
-    <p:notesMasterId r:id="rId5"/>
+    <p:notesMasterId r:id="rId6"/>
   </p:notesMasterIdLst>
   <p:sldIdLst>
-    <p:sldId id="256" r:id="rId2"/>
-    <p:sldId id="257" r:id="rId3"/>
-    <p:sldId id="258" r:id="rId4"/>
+    <p:sldId id="259" r:id="rId2"/>
+    <p:sldId id="256" r:id="rId3"/>
+    <p:sldId id="257" r:id="rId4"/>
+    <p:sldId id="258" r:id="rId5"/>
   </p:sldIdLst>
   <p:sldSz cx="12192000" cy="6858000"/>
   <p:notesSz cx="6858000" cy="9144000"/>
@@ -109,6 +110,11 @@
       </a:defRPr>
     </a:lvl9pPr>
   </p:defaultTextStyle>
+  <p:extLst>
+    <p:ext uri="{EFAFB233-063F-42B5-8137-9DF3F51BA10A}">
+      <p15:sldGuideLst xmlns:p15="http://schemas.microsoft.com/office/powerpoint/2012/main"/>
+    </p:ext>
+  </p:extLst>
 </p:presentation>
 </file>
 
@@ -970,7 +976,7 @@
           <a:p>
             <a:fld id="{F0CD090D-B84B-47EA-8A8C-D72E4AC59A0E}" type="datetimeFigureOut">
               <a:rPr lang="es-AR" smtClean="0"/>
-              <a:t>02/11/2013</a:t>
+              <a:t>06/11/2013</a:t>
             </a:fld>
             <a:endParaRPr lang="es-AR"/>
           </a:p>
@@ -1282,7 +1288,7 @@
           <a:bodyPr/>
           <a:lstStyle/>
           <a:p>
-            <a:endParaRPr lang="es-AR"/>
+            <a:endParaRPr lang="es-AR" dirty="0"/>
           </a:p>
         </p:txBody>
       </p:sp>
@@ -1303,7 +1309,7 @@
           <a:p>
             <a:fld id="{368D506C-FCFD-4CD4-9ECF-8ED3F09A5238}" type="slidenum">
               <a:rPr lang="es-AR" smtClean="0"/>
-              <a:t>2</a:t>
+              <a:t>1</a:t>
             </a:fld>
             <a:endParaRPr lang="es-AR"/>
           </a:p>
@@ -1312,7 +1318,7 @@
     </p:spTree>
     <p:extLst>
       <p:ext uri="{BB962C8B-B14F-4D97-AF65-F5344CB8AC3E}">
-        <p14:creationId xmlns:p14="http://schemas.microsoft.com/office/powerpoint/2010/main" val="2384356202"/>
+        <p14:creationId xmlns:p14="http://schemas.microsoft.com/office/powerpoint/2010/main" val="2899072837"/>
       </p:ext>
     </p:extLst>
   </p:cSld>
@@ -1388,6 +1394,90 @@
             <a:fld id="{368D506C-FCFD-4CD4-9ECF-8ED3F09A5238}" type="slidenum">
               <a:rPr lang="es-AR" smtClean="0"/>
               <a:t>3</a:t>
+            </a:fld>
+            <a:endParaRPr lang="es-AR"/>
+          </a:p>
+        </p:txBody>
+      </p:sp>
+    </p:spTree>
+    <p:extLst>
+      <p:ext uri="{BB962C8B-B14F-4D97-AF65-F5344CB8AC3E}">
+        <p14:creationId xmlns:p14="http://schemas.microsoft.com/office/powerpoint/2010/main" val="2384356202"/>
+      </p:ext>
+    </p:extLst>
+  </p:cSld>
+  <p:clrMapOvr>
+    <a:masterClrMapping/>
+  </p:clrMapOvr>
+</p:notes>
+</file>
+
+<file path=ppt/notesSlides/notesSlide3.xml><?xml version="1.0" encoding="utf-8"?>
+<p:notes xmlns:a="http://schemas.openxmlformats.org/drawingml/2006/main" xmlns:r="http://schemas.openxmlformats.org/officeDocument/2006/relationships" xmlns:p="http://schemas.openxmlformats.org/presentationml/2006/main">
+  <p:cSld>
+    <p:spTree>
+      <p:nvGrpSpPr>
+        <p:cNvPr id="1" name=""/>
+        <p:cNvGrpSpPr/>
+        <p:nvPr/>
+      </p:nvGrpSpPr>
+      <p:grpSpPr>
+        <a:xfrm>
+          <a:off x="0" y="0"/>
+          <a:ext cx="0" cy="0"/>
+          <a:chOff x="0" y="0"/>
+          <a:chExt cx="0" cy="0"/>
+        </a:xfrm>
+      </p:grpSpPr>
+      <p:sp>
+        <p:nvSpPr>
+          <p:cNvPr id="2" name="Slide Image Placeholder 1"/>
+          <p:cNvSpPr>
+            <a:spLocks noGrp="1" noRot="1" noChangeAspect="1"/>
+          </p:cNvSpPr>
+          <p:nvPr>
+            <p:ph type="sldImg"/>
+          </p:nvPr>
+        </p:nvSpPr>
+        <p:spPr/>
+      </p:sp>
+      <p:sp>
+        <p:nvSpPr>
+          <p:cNvPr id="3" name="Notes Placeholder 2"/>
+          <p:cNvSpPr>
+            <a:spLocks noGrp="1"/>
+          </p:cNvSpPr>
+          <p:nvPr>
+            <p:ph type="body" idx="1"/>
+          </p:nvPr>
+        </p:nvSpPr>
+        <p:spPr/>
+        <p:txBody>
+          <a:bodyPr/>
+          <a:lstStyle/>
+          <a:p>
+            <a:endParaRPr lang="es-AR"/>
+          </a:p>
+        </p:txBody>
+      </p:sp>
+      <p:sp>
+        <p:nvSpPr>
+          <p:cNvPr id="4" name="Slide Number Placeholder 3"/>
+          <p:cNvSpPr>
+            <a:spLocks noGrp="1"/>
+          </p:cNvSpPr>
+          <p:nvPr>
+            <p:ph type="sldNum" sz="quarter" idx="10"/>
+          </p:nvPr>
+        </p:nvSpPr>
+        <p:spPr/>
+        <p:txBody>
+          <a:bodyPr/>
+          <a:lstStyle/>
+          <a:p>
+            <a:fld id="{368D506C-FCFD-4CD4-9ECF-8ED3F09A5238}" type="slidenum">
+              <a:rPr lang="es-AR" smtClean="0"/>
+              <a:t>4</a:t>
             </a:fld>
             <a:endParaRPr lang="es-AR"/>
           </a:p>
@@ -1537,7 +1627,7 @@
           <a:p>
             <a:fld id="{0B65E829-B7E5-4E9A-A515-1B71D16E03F6}" type="datetimeFigureOut">
               <a:rPr lang="es-AR" smtClean="0"/>
-              <a:t>02/11/2013</a:t>
+              <a:t>06/11/2013</a:t>
             </a:fld>
             <a:endParaRPr lang="es-AR"/>
           </a:p>
@@ -1707,7 +1797,7 @@
           <a:p>
             <a:fld id="{0B65E829-B7E5-4E9A-A515-1B71D16E03F6}" type="datetimeFigureOut">
               <a:rPr lang="es-AR" smtClean="0"/>
-              <a:t>02/11/2013</a:t>
+              <a:t>06/11/2013</a:t>
             </a:fld>
             <a:endParaRPr lang="es-AR"/>
           </a:p>
@@ -1887,7 +1977,7 @@
           <a:p>
             <a:fld id="{0B65E829-B7E5-4E9A-A515-1B71D16E03F6}" type="datetimeFigureOut">
               <a:rPr lang="es-AR" smtClean="0"/>
-              <a:t>02/11/2013</a:t>
+              <a:t>06/11/2013</a:t>
             </a:fld>
             <a:endParaRPr lang="es-AR"/>
           </a:p>
@@ -2057,7 +2147,7 @@
           <a:p>
             <a:fld id="{0B65E829-B7E5-4E9A-A515-1B71D16E03F6}" type="datetimeFigureOut">
               <a:rPr lang="es-AR" smtClean="0"/>
-              <a:t>02/11/2013</a:t>
+              <a:t>06/11/2013</a:t>
             </a:fld>
             <a:endParaRPr lang="es-AR"/>
           </a:p>
@@ -2303,7 +2393,7 @@
           <a:p>
             <a:fld id="{0B65E829-B7E5-4E9A-A515-1B71D16E03F6}" type="datetimeFigureOut">
               <a:rPr lang="es-AR" smtClean="0"/>
-              <a:t>02/11/2013</a:t>
+              <a:t>06/11/2013</a:t>
             </a:fld>
             <a:endParaRPr lang="es-AR"/>
           </a:p>
@@ -2535,7 +2625,7 @@
           <a:p>
             <a:fld id="{0B65E829-B7E5-4E9A-A515-1B71D16E03F6}" type="datetimeFigureOut">
               <a:rPr lang="es-AR" smtClean="0"/>
-              <a:t>02/11/2013</a:t>
+              <a:t>06/11/2013</a:t>
             </a:fld>
             <a:endParaRPr lang="es-AR"/>
           </a:p>
@@ -2902,7 +2992,7 @@
           <a:p>
             <a:fld id="{0B65E829-B7E5-4E9A-A515-1B71D16E03F6}" type="datetimeFigureOut">
               <a:rPr lang="es-AR" smtClean="0"/>
-              <a:t>02/11/2013</a:t>
+              <a:t>06/11/2013</a:t>
             </a:fld>
             <a:endParaRPr lang="es-AR"/>
           </a:p>
@@ -3020,7 +3110,7 @@
           <a:p>
             <a:fld id="{0B65E829-B7E5-4E9A-A515-1B71D16E03F6}" type="datetimeFigureOut">
               <a:rPr lang="es-AR" smtClean="0"/>
-              <a:t>02/11/2013</a:t>
+              <a:t>06/11/2013</a:t>
             </a:fld>
             <a:endParaRPr lang="es-AR"/>
           </a:p>
@@ -3115,7 +3205,7 @@
           <a:p>
             <a:fld id="{0B65E829-B7E5-4E9A-A515-1B71D16E03F6}" type="datetimeFigureOut">
               <a:rPr lang="es-AR" smtClean="0"/>
-              <a:t>02/11/2013</a:t>
+              <a:t>06/11/2013</a:t>
             </a:fld>
             <a:endParaRPr lang="es-AR"/>
           </a:p>
@@ -3392,7 +3482,7 @@
           <a:p>
             <a:fld id="{0B65E829-B7E5-4E9A-A515-1B71D16E03F6}" type="datetimeFigureOut">
               <a:rPr lang="es-AR" smtClean="0"/>
-              <a:t>02/11/2013</a:t>
+              <a:t>06/11/2013</a:t>
             </a:fld>
             <a:endParaRPr lang="es-AR"/>
           </a:p>
@@ -3645,7 +3735,7 @@
           <a:p>
             <a:fld id="{0B65E829-B7E5-4E9A-A515-1B71D16E03F6}" type="datetimeFigureOut">
               <a:rPr lang="es-AR" smtClean="0"/>
-              <a:t>02/11/2013</a:t>
+              <a:t>06/11/2013</a:t>
             </a:fld>
             <a:endParaRPr lang="es-AR"/>
           </a:p>
@@ -3858,7 +3948,7 @@
           <a:p>
             <a:fld id="{0B65E829-B7E5-4E9A-A515-1B71D16E03F6}" type="datetimeFigureOut">
               <a:rPr lang="es-AR" smtClean="0"/>
-              <a:t>02/11/2013</a:t>
+              <a:t>06/11/2013</a:t>
             </a:fld>
             <a:endParaRPr lang="es-AR"/>
           </a:p>
@@ -4263,6 +4353,218 @@
           <a:chExt cx="0" cy="0"/>
         </a:xfrm>
       </p:grpSpPr>
+      <p:sp>
+        <p:nvSpPr>
+          <p:cNvPr id="9" name="Rectangle 8"/>
+          <p:cNvSpPr/>
+          <p:nvPr/>
+        </p:nvSpPr>
+        <p:spPr>
+          <a:xfrm>
+            <a:off x="1" y="733425"/>
+            <a:ext cx="12192000" cy="6124575"/>
+          </a:xfrm>
+          <a:prstGeom prst="rect">
+            <a:avLst/>
+          </a:prstGeom>
+        </p:spPr>
+        <p:style>
+          <a:lnRef idx="3">
+            <a:schemeClr val="lt1"/>
+          </a:lnRef>
+          <a:fillRef idx="1">
+            <a:schemeClr val="accent3"/>
+          </a:fillRef>
+          <a:effectRef idx="1">
+            <a:schemeClr val="accent3"/>
+          </a:effectRef>
+          <a:fontRef idx="minor">
+            <a:schemeClr val="lt1"/>
+          </a:fontRef>
+        </p:style>
+        <p:txBody>
+          <a:bodyPr rtlCol="0" anchor="ctr"/>
+          <a:lstStyle/>
+          <a:p>
+            <a:pPr algn="ctr"/>
+            <a:endParaRPr lang="es-AR"/>
+          </a:p>
+        </p:txBody>
+      </p:sp>
+      <p:pic>
+        <p:nvPicPr>
+          <p:cNvPr id="5" name="Picture 4"/>
+          <p:cNvPicPr>
+            <a:picLocks noChangeAspect="1"/>
+          </p:cNvPicPr>
+          <p:nvPr/>
+        </p:nvPicPr>
+        <p:blipFill>
+          <a:blip r:embed="rId3"/>
+          <a:stretch>
+            <a:fillRect/>
+          </a:stretch>
+        </p:blipFill>
+        <p:spPr>
+          <a:xfrm>
+            <a:off x="1558487" y="0"/>
+            <a:ext cx="9201150" cy="733425"/>
+          </a:xfrm>
+          <a:prstGeom prst="rect">
+            <a:avLst/>
+          </a:prstGeom>
+        </p:spPr>
+      </p:pic>
+      <p:sp>
+        <p:nvSpPr>
+          <p:cNvPr id="6" name="TextBox 5"/>
+          <p:cNvSpPr txBox="1"/>
+          <p:nvPr/>
+        </p:nvSpPr>
+        <p:spPr>
+          <a:xfrm>
+            <a:off x="1558487" y="1182414"/>
+            <a:ext cx="3360354" cy="646331"/>
+          </a:xfrm>
+          <a:prstGeom prst="rect">
+            <a:avLst/>
+          </a:prstGeom>
+          <a:noFill/>
+        </p:spPr>
+        <p:txBody>
+          <a:bodyPr wrap="square" rtlCol="0">
+            <a:spAutoFit/>
+          </a:bodyPr>
+          <a:lstStyle/>
+          <a:p>
+            <a:r>
+              <a:rPr lang="en-US" sz="3600" b="1" dirty="0" err="1" smtClean="0">
+                <a:solidFill>
+                  <a:srgbClr val="7D5037"/>
+                </a:solidFill>
+              </a:rPr>
+              <a:t>Reportes</a:t>
+            </a:r>
+            <a:endParaRPr lang="es-AR" b="1" dirty="0">
+              <a:solidFill>
+                <a:srgbClr val="7D5037"/>
+              </a:solidFill>
+            </a:endParaRPr>
+          </a:p>
+        </p:txBody>
+      </p:sp>
+      <p:sp>
+        <p:nvSpPr>
+          <p:cNvPr id="7" name="Rectangle 6"/>
+          <p:cNvSpPr/>
+          <p:nvPr/>
+        </p:nvSpPr>
+        <p:spPr>
+          <a:xfrm>
+            <a:off x="1558487" y="1828745"/>
+            <a:ext cx="2319289" cy="369332"/>
+          </a:xfrm>
+          <a:prstGeom prst="rect">
+            <a:avLst/>
+          </a:prstGeom>
+        </p:spPr>
+        <p:txBody>
+          <a:bodyPr wrap="none">
+            <a:spAutoFit/>
+          </a:bodyPr>
+          <a:lstStyle/>
+          <a:p>
+            <a:r>
+              <a:rPr lang="es-AR" u="sng" dirty="0">
+                <a:solidFill>
+                  <a:schemeClr val="accent2">
+                    <a:lumMod val="75000"/>
+                  </a:schemeClr>
+                </a:solidFill>
+              </a:rPr>
+              <a:t>Horarios más vendidos</a:t>
+            </a:r>
+            <a:endParaRPr lang="es-AR" b="1" u="sng" dirty="0">
+              <a:solidFill>
+                <a:schemeClr val="accent2">
+                  <a:lumMod val="75000"/>
+                </a:schemeClr>
+              </a:solidFill>
+            </a:endParaRPr>
+          </a:p>
+        </p:txBody>
+      </p:sp>
+      <p:sp>
+        <p:nvSpPr>
+          <p:cNvPr id="8" name="Rectangle 7"/>
+          <p:cNvSpPr/>
+          <p:nvPr/>
+        </p:nvSpPr>
+        <p:spPr>
+          <a:xfrm>
+            <a:off x="1558487" y="2261029"/>
+            <a:ext cx="3544881" cy="369332"/>
+          </a:xfrm>
+          <a:prstGeom prst="rect">
+            <a:avLst/>
+          </a:prstGeom>
+        </p:spPr>
+        <p:txBody>
+          <a:bodyPr wrap="none">
+            <a:spAutoFit/>
+          </a:bodyPr>
+          <a:lstStyle/>
+          <a:p>
+            <a:r>
+              <a:rPr lang="es-AR" u="sng" dirty="0">
+                <a:solidFill>
+                  <a:schemeClr val="accent2">
+                    <a:lumMod val="75000"/>
+                  </a:schemeClr>
+                </a:solidFill>
+              </a:rPr>
+              <a:t>Entradas más vendidas por película</a:t>
+            </a:r>
+            <a:endParaRPr lang="es-AR" u="sng" dirty="0">
+              <a:solidFill>
+                <a:schemeClr val="accent2">
+                  <a:lumMod val="75000"/>
+                </a:schemeClr>
+              </a:solidFill>
+            </a:endParaRPr>
+          </a:p>
+        </p:txBody>
+      </p:sp>
+    </p:spTree>
+    <p:extLst>
+      <p:ext uri="{BB962C8B-B14F-4D97-AF65-F5344CB8AC3E}">
+        <p14:creationId xmlns:p14="http://schemas.microsoft.com/office/powerpoint/2010/main" val="3873947828"/>
+      </p:ext>
+    </p:extLst>
+  </p:cSld>
+  <p:clrMapOvr>
+    <a:masterClrMapping/>
+  </p:clrMapOvr>
+</p:sld>
+</file>
+
+<file path=ppt/slides/slide2.xml><?xml version="1.0" encoding="utf-8"?>
+<p:sld xmlns:a="http://schemas.openxmlformats.org/drawingml/2006/main" xmlns:r="http://schemas.openxmlformats.org/officeDocument/2006/relationships" xmlns:p="http://schemas.openxmlformats.org/presentationml/2006/main">
+  <p:cSld>
+    <p:spTree>
+      <p:nvGrpSpPr>
+        <p:cNvPr id="1" name=""/>
+        <p:cNvGrpSpPr/>
+        <p:nvPr/>
+      </p:nvGrpSpPr>
+      <p:grpSpPr>
+        <a:xfrm>
+          <a:off x="0" y="0"/>
+          <a:ext cx="0" cy="0"/>
+          <a:chOff x="0" y="0"/>
+          <a:chExt cx="0" cy="0"/>
+        </a:xfrm>
+      </p:grpSpPr>
       <p:grpSp>
         <p:nvGrpSpPr>
           <p:cNvPr id="102" name="Group 101"/>
@@ -4271,10 +4573,10 @@
         </p:nvGrpSpPr>
         <p:grpSpPr>
           <a:xfrm>
-            <a:off x="1042668" y="13447"/>
-            <a:ext cx="10736895" cy="5360875"/>
+            <a:off x="727553" y="1055993"/>
+            <a:ext cx="10736895" cy="4746015"/>
             <a:chOff x="1042668" y="13447"/>
-            <a:chExt cx="10736895" cy="5360875"/>
+            <a:chExt cx="10736895" cy="4746015"/>
           </a:xfrm>
         </p:grpSpPr>
         <p:sp>
@@ -4565,11 +4867,7 @@
               <a:p>
                 <a:r>
                   <a:rPr lang="en-US" dirty="0" err="1" smtClean="0"/>
-                  <a:t>Funci</a:t>
-                </a:r>
-                <a:r>
-                  <a:rPr lang="en-US" dirty="0" err="1" smtClean="0"/>
-                  <a:t>ón</a:t>
+                  <a:t>Función</a:t>
                 </a:r>
                 <a:r>
                   <a:rPr lang="en-US" dirty="0" smtClean="0"/>
@@ -4911,7 +5209,7 @@
           </p:nvSpPr>
           <p:spPr>
             <a:xfrm>
-              <a:off x="1085412" y="2162062"/>
+              <a:off x="1101002" y="1689318"/>
               <a:ext cx="10629603" cy="255494"/>
             </a:xfrm>
             <a:prstGeom prst="rect">
@@ -4955,7 +5253,7 @@
           </p:nvSpPr>
           <p:spPr>
             <a:xfrm>
-              <a:off x="1137347" y="2915097"/>
+              <a:off x="1137347" y="2300237"/>
               <a:ext cx="497541" cy="497541"/>
             </a:xfrm>
             <a:prstGeom prst="ellipse">
@@ -4993,7 +5291,7 @@
           </p:nvSpPr>
           <p:spPr>
             <a:xfrm>
-              <a:off x="2554505" y="2915097"/>
+              <a:off x="2554505" y="2300237"/>
               <a:ext cx="497541" cy="497541"/>
             </a:xfrm>
             <a:prstGeom prst="ellipse">
@@ -5047,7 +5345,7 @@
           </p:nvSpPr>
           <p:spPr>
             <a:xfrm>
-              <a:off x="4033617" y="2915097"/>
+              <a:off x="4033617" y="2300237"/>
               <a:ext cx="497541" cy="497541"/>
             </a:xfrm>
             <a:prstGeom prst="ellipse">
@@ -5101,7 +5399,7 @@
           </p:nvSpPr>
           <p:spPr>
             <a:xfrm>
-              <a:off x="5454073" y="2915097"/>
+              <a:off x="5454073" y="2300237"/>
               <a:ext cx="497541" cy="497541"/>
             </a:xfrm>
             <a:prstGeom prst="ellipse">
@@ -5155,7 +5453,7 @@
           </p:nvSpPr>
           <p:spPr>
             <a:xfrm>
-              <a:off x="6965296" y="2915097"/>
+              <a:off x="6965296" y="2300237"/>
               <a:ext cx="497541" cy="497541"/>
             </a:xfrm>
             <a:prstGeom prst="ellipse">
@@ -5193,7 +5491,7 @@
           </p:nvSpPr>
           <p:spPr>
             <a:xfrm>
-              <a:off x="8382454" y="2915097"/>
+              <a:off x="8382454" y="2300237"/>
               <a:ext cx="497541" cy="497541"/>
             </a:xfrm>
             <a:prstGeom prst="ellipse">
@@ -5247,7 +5545,7 @@
           </p:nvSpPr>
           <p:spPr>
             <a:xfrm>
-              <a:off x="9861566" y="2915097"/>
+              <a:off x="9861566" y="2300237"/>
               <a:ext cx="497541" cy="497541"/>
             </a:xfrm>
             <a:prstGeom prst="ellipse">
@@ -5301,7 +5599,7 @@
           </p:nvSpPr>
           <p:spPr>
             <a:xfrm>
-              <a:off x="11282022" y="2915097"/>
+              <a:off x="11282022" y="2300237"/>
               <a:ext cx="497541" cy="497541"/>
             </a:xfrm>
             <a:prstGeom prst="ellipse">
@@ -5355,7 +5653,7 @@
           </p:nvSpPr>
           <p:spPr>
             <a:xfrm>
-              <a:off x="1137347" y="3895939"/>
+              <a:off x="1137347" y="3281079"/>
               <a:ext cx="497541" cy="497541"/>
             </a:xfrm>
             <a:prstGeom prst="ellipse">
@@ -5409,7 +5707,7 @@
           </p:nvSpPr>
           <p:spPr>
             <a:xfrm>
-              <a:off x="2554505" y="3895939"/>
+              <a:off x="2554505" y="3281079"/>
               <a:ext cx="497541" cy="497541"/>
             </a:xfrm>
             <a:prstGeom prst="ellipse">
@@ -5447,7 +5745,7 @@
           </p:nvSpPr>
           <p:spPr>
             <a:xfrm>
-              <a:off x="4033617" y="3895939"/>
+              <a:off x="4033617" y="3281079"/>
               <a:ext cx="497541" cy="497541"/>
             </a:xfrm>
             <a:prstGeom prst="ellipse">
@@ -5501,7 +5799,7 @@
           </p:nvSpPr>
           <p:spPr>
             <a:xfrm>
-              <a:off x="5454073" y="3895939"/>
+              <a:off x="5454073" y="3281079"/>
               <a:ext cx="497541" cy="497541"/>
             </a:xfrm>
             <a:prstGeom prst="ellipse">
@@ -5539,7 +5837,7 @@
           </p:nvSpPr>
           <p:spPr>
             <a:xfrm>
-              <a:off x="6965296" y="3895939"/>
+              <a:off x="6965296" y="3281079"/>
               <a:ext cx="497541" cy="497541"/>
             </a:xfrm>
             <a:prstGeom prst="ellipse">
@@ -5593,7 +5891,7 @@
           </p:nvSpPr>
           <p:spPr>
             <a:xfrm>
-              <a:off x="8382454" y="3895939"/>
+              <a:off x="8382454" y="3281079"/>
               <a:ext cx="497541" cy="497541"/>
             </a:xfrm>
             <a:prstGeom prst="ellipse">
@@ -5631,7 +5929,7 @@
           </p:nvSpPr>
           <p:spPr>
             <a:xfrm>
-              <a:off x="9861566" y="3895939"/>
+              <a:off x="9861566" y="3281079"/>
               <a:ext cx="497541" cy="497541"/>
             </a:xfrm>
             <a:prstGeom prst="ellipse">
@@ -5685,7 +5983,7 @@
           </p:nvSpPr>
           <p:spPr>
             <a:xfrm>
-              <a:off x="11282022" y="3895939"/>
+              <a:off x="11282022" y="3281079"/>
               <a:ext cx="497541" cy="497541"/>
             </a:xfrm>
             <a:prstGeom prst="ellipse">
@@ -5723,7 +6021,7 @@
           </p:nvSpPr>
           <p:spPr>
             <a:xfrm>
-              <a:off x="1137347" y="4876781"/>
+              <a:off x="1137347" y="4261921"/>
               <a:ext cx="497541" cy="497541"/>
             </a:xfrm>
             <a:prstGeom prst="ellipse">
@@ -5777,7 +6075,7 @@
           </p:nvSpPr>
           <p:spPr>
             <a:xfrm>
-              <a:off x="2554505" y="4876781"/>
+              <a:off x="2554505" y="4261921"/>
               <a:ext cx="497541" cy="497541"/>
             </a:xfrm>
             <a:prstGeom prst="ellipse">
@@ -5831,7 +6129,7 @@
           </p:nvSpPr>
           <p:spPr>
             <a:xfrm>
-              <a:off x="4033617" y="4876781"/>
+              <a:off x="4033617" y="4261921"/>
               <a:ext cx="497541" cy="497541"/>
             </a:xfrm>
             <a:prstGeom prst="ellipse">
@@ -5869,7 +6167,7 @@
           </p:nvSpPr>
           <p:spPr>
             <a:xfrm>
-              <a:off x="5454073" y="4876781"/>
+              <a:off x="5454073" y="4261921"/>
               <a:ext cx="497541" cy="497541"/>
             </a:xfrm>
             <a:prstGeom prst="ellipse">
@@ -5923,7 +6221,7 @@
           </p:nvSpPr>
           <p:spPr>
             <a:xfrm>
-              <a:off x="6965296" y="4876781"/>
+              <a:off x="6965296" y="4261921"/>
               <a:ext cx="497541" cy="497541"/>
             </a:xfrm>
             <a:prstGeom prst="ellipse">
@@ -5977,7 +6275,7 @@
           </p:nvSpPr>
           <p:spPr>
             <a:xfrm>
-              <a:off x="8382454" y="4876781"/>
+              <a:off x="8382454" y="4261921"/>
               <a:ext cx="497541" cy="497541"/>
             </a:xfrm>
             <a:prstGeom prst="ellipse">
@@ -6031,7 +6329,7 @@
           </p:nvSpPr>
           <p:spPr>
             <a:xfrm>
-              <a:off x="9861566" y="4876781"/>
+              <a:off x="9861566" y="4261921"/>
               <a:ext cx="497541" cy="497541"/>
             </a:xfrm>
             <a:prstGeom prst="ellipse">
@@ -6069,7 +6367,7 @@
           </p:nvSpPr>
           <p:spPr>
             <a:xfrm>
-              <a:off x="11282022" y="4876781"/>
+              <a:off x="11282022" y="4261921"/>
               <a:ext cx="497541" cy="497541"/>
             </a:xfrm>
             <a:prstGeom prst="ellipse">
@@ -6177,7 +6475,7 @@
           </p:nvSpPr>
           <p:spPr>
             <a:xfrm>
-              <a:off x="1164728" y="1511287"/>
+              <a:off x="2518012" y="1227211"/>
               <a:ext cx="260659" cy="260659"/>
             </a:xfrm>
             <a:prstGeom prst="ellipse">
@@ -6231,7 +6529,7 @@
           </p:nvSpPr>
           <p:spPr>
             <a:xfrm>
-              <a:off x="1164727" y="1815238"/>
+              <a:off x="4012210" y="1216106"/>
               <a:ext cx="260659" cy="260659"/>
             </a:xfrm>
             <a:prstGeom prst="ellipse">
@@ -6300,7 +6598,7 @@
           </p:nvSpPr>
           <p:spPr>
             <a:xfrm>
-              <a:off x="1425386" y="1442720"/>
+              <a:off x="2778670" y="1158644"/>
               <a:ext cx="1223685" cy="369332"/>
             </a:xfrm>
             <a:prstGeom prst="rect">
@@ -6330,7 +6628,7 @@
           </p:nvSpPr>
           <p:spPr>
             <a:xfrm>
-              <a:off x="1431455" y="1755724"/>
+              <a:off x="4278938" y="1156592"/>
               <a:ext cx="1223685" cy="369332"/>
             </a:xfrm>
             <a:prstGeom prst="rect">
@@ -6366,7 +6664,7 @@
 </p:sld>
 </file>
 
-<file path=ppt/slides/slide2.xml><?xml version="1.0" encoding="utf-8"?>
+<file path=ppt/slides/slide3.xml><?xml version="1.0" encoding="utf-8"?>
 <p:sld xmlns:a="http://schemas.openxmlformats.org/drawingml/2006/main" xmlns:r="http://schemas.openxmlformats.org/officeDocument/2006/relationships" xmlns:p="http://schemas.openxmlformats.org/presentationml/2006/main">
   <p:cSld>
     <p:spTree>
@@ -6823,14 +7121,14 @@
           <p:nvPr>
             <p:extLst>
               <p:ext uri="{D42A27DB-BD31-4B8C-83A1-F6EECF244321}">
-                <p14:modId xmlns:p14="http://schemas.microsoft.com/office/powerpoint/2010/main" val="3781575048"/>
+                <p14:modId xmlns:p14="http://schemas.microsoft.com/office/powerpoint/2010/main" val="1324761133"/>
               </p:ext>
             </p:extLst>
           </p:nvPr>
         </p:nvGraphicFramePr>
         <p:xfrm>
-          <a:off x="2032001" y="1046759"/>
-          <a:ext cx="8127999" cy="1478280"/>
+          <a:off x="4229247" y="5161867"/>
+          <a:ext cx="3733507" cy="1478280"/>
         </p:xfrm>
         <a:graphic>
           <a:graphicData uri="http://schemas.openxmlformats.org/drawingml/2006/table">
@@ -6839,26 +7137,10 @@
                 <a:tableStyleId>{2D5ABB26-0587-4C30-8999-92F81FD0307C}</a:tableStyleId>
               </a:tblPr>
               <a:tblGrid>
-                <a:gridCol w="2768600"/>
-                <a:gridCol w="2650066"/>
-                <a:gridCol w="2709333"/>
+                <a:gridCol w="1340069"/>
+                <a:gridCol w="2393438"/>
               </a:tblGrid>
               <a:tr h="365182">
-                <a:tc>
-                  <a:txBody>
-                    <a:bodyPr/>
-                    <a:lstStyle/>
-                    <a:p>
-                      <a:pPr algn="ctr"/>
-                      <a:r>
-                        <a:rPr lang="en-US" dirty="0" err="1" smtClean="0"/>
-                        <a:t>Complejo</a:t>
-                      </a:r>
-                      <a:endParaRPr lang="es-AR" dirty="0"/>
-                    </a:p>
-                  </a:txBody>
-                  <a:tcPr/>
-                </a:tc>
                 <a:tc>
                   <a:txBody>
                     <a:bodyPr/>
@@ -6906,21 +7188,6 @@
                     <a:p>
                       <a:pPr algn="ctr"/>
                       <a:r>
-                        <a:rPr lang="en-US" dirty="0" err="1" smtClean="0"/>
-                        <a:t>Microcentro</a:t>
-                      </a:r>
-                      <a:endParaRPr lang="es-AR" dirty="0"/>
-                    </a:p>
-                  </a:txBody>
-                  <a:tcPr/>
-                </a:tc>
-                <a:tc>
-                  <a:txBody>
-                    <a:bodyPr/>
-                    <a:lstStyle/>
-                    <a:p>
-                      <a:pPr algn="ctr"/>
-                      <a:r>
                         <a:rPr lang="en-US" dirty="0" smtClean="0"/>
                         <a:t>22:20</a:t>
                       </a:r>
@@ -6946,21 +7213,6 @@
                 </a:tc>
               </a:tr>
               <a:tr h="370840">
-                <a:tc>
-                  <a:txBody>
-                    <a:bodyPr/>
-                    <a:lstStyle/>
-                    <a:p>
-                      <a:pPr algn="ctr"/>
-                      <a:r>
-                        <a:rPr lang="en-US" dirty="0" err="1" smtClean="0"/>
-                        <a:t>Microcentro</a:t>
-                      </a:r>
-                      <a:endParaRPr lang="es-AR" dirty="0"/>
-                    </a:p>
-                  </a:txBody>
-                  <a:tcPr/>
-                </a:tc>
                 <a:tc>
                   <a:txBody>
                     <a:bodyPr/>
@@ -7000,21 +7252,6 @@
                     <a:p>
                       <a:pPr algn="ctr"/>
                       <a:r>
-                        <a:rPr lang="en-US" dirty="0" err="1" smtClean="0"/>
-                        <a:t>Microcentro</a:t>
-                      </a:r>
-                      <a:endParaRPr lang="es-AR" dirty="0"/>
-                    </a:p>
-                  </a:txBody>
-                  <a:tcPr/>
-                </a:tc>
-                <a:tc>
-                  <a:txBody>
-                    <a:bodyPr/>
-                    <a:lstStyle/>
-                    <a:p>
-                      <a:pPr algn="ctr"/>
-                      <a:r>
                         <a:rPr lang="en-US" dirty="0" smtClean="0"/>
                         <a:t>10:30</a:t>
                       </a:r>
@@ -7043,404 +7280,419 @@
           </a:graphicData>
         </a:graphic>
       </p:graphicFrame>
-      <p:cxnSp>
-        <p:nvCxnSpPr>
-          <p:cNvPr id="10" name="Straight Connector 9"/>
-          <p:cNvCxnSpPr/>
+      <p:grpSp>
+        <p:nvGrpSpPr>
+          <p:cNvPr id="4" name="Group 3"/>
+          <p:cNvGrpSpPr/>
           <p:nvPr/>
-        </p:nvCxnSpPr>
-        <p:spPr>
+        </p:nvGrpSpPr>
+        <p:grpSpPr>
           <a:xfrm>
-            <a:off x="3765177" y="6414246"/>
-            <a:ext cx="5916706" cy="26894"/>
+            <a:off x="2534713" y="959391"/>
+            <a:ext cx="7122574" cy="4058307"/>
+            <a:chOff x="2559309" y="2770093"/>
+            <a:chExt cx="7122574" cy="4058307"/>
           </a:xfrm>
-          <a:prstGeom prst="line">
-            <a:avLst/>
-          </a:prstGeom>
-        </p:spPr>
-        <p:style>
-          <a:lnRef idx="1">
-            <a:schemeClr val="dk1"/>
-          </a:lnRef>
-          <a:fillRef idx="0">
-            <a:schemeClr val="dk1"/>
-          </a:fillRef>
-          <a:effectRef idx="0">
-            <a:schemeClr val="dk1"/>
-          </a:effectRef>
-          <a:fontRef idx="minor">
-            <a:schemeClr val="tx1"/>
-          </a:fontRef>
-        </p:style>
-      </p:cxnSp>
-      <p:cxnSp>
-        <p:nvCxnSpPr>
-          <p:cNvPr id="105" name="Straight Connector 104"/>
-          <p:cNvCxnSpPr/>
-          <p:nvPr/>
-        </p:nvCxnSpPr>
-        <p:spPr>
-          <a:xfrm flipV="1">
-            <a:off x="3917577" y="2770093"/>
-            <a:ext cx="22411" cy="3796553"/>
-          </a:xfrm>
-          <a:prstGeom prst="line">
-            <a:avLst/>
-          </a:prstGeom>
-        </p:spPr>
-        <p:style>
-          <a:lnRef idx="1">
-            <a:schemeClr val="dk1"/>
-          </a:lnRef>
-          <a:fillRef idx="0">
-            <a:schemeClr val="dk1"/>
-          </a:fillRef>
-          <a:effectRef idx="0">
-            <a:schemeClr val="dk1"/>
-          </a:effectRef>
-          <a:fontRef idx="minor">
-            <a:schemeClr val="tx1"/>
-          </a:fontRef>
-        </p:style>
-      </p:cxnSp>
-      <p:sp>
-        <p:nvSpPr>
-          <p:cNvPr id="12" name="Rectangle 11"/>
-          <p:cNvSpPr/>
-          <p:nvPr/>
-        </p:nvSpPr>
-        <p:spPr>
-          <a:xfrm>
-            <a:off x="4397188" y="3442446"/>
-            <a:ext cx="591671" cy="2985247"/>
-          </a:xfrm>
-          <a:prstGeom prst="rect">
-            <a:avLst/>
-          </a:prstGeom>
-        </p:spPr>
-        <p:style>
-          <a:lnRef idx="2">
-            <a:schemeClr val="accent1">
-              <a:shade val="50000"/>
-            </a:schemeClr>
-          </a:lnRef>
-          <a:fillRef idx="1">
-            <a:schemeClr val="accent1"/>
-          </a:fillRef>
-          <a:effectRef idx="0">
-            <a:schemeClr val="accent1"/>
-          </a:effectRef>
-          <a:fontRef idx="minor">
-            <a:schemeClr val="lt1"/>
-          </a:fontRef>
-        </p:style>
-        <p:txBody>
-          <a:bodyPr rtlCol="0" anchor="ctr"/>
-          <a:lstStyle/>
-          <a:p>
-            <a:pPr algn="ctr"/>
-            <a:endParaRPr lang="es-AR"/>
-          </a:p>
-        </p:txBody>
-      </p:sp>
-      <p:sp>
-        <p:nvSpPr>
-          <p:cNvPr id="106" name="Rectangle 105"/>
-          <p:cNvSpPr/>
-          <p:nvPr/>
-        </p:nvSpPr>
-        <p:spPr>
-          <a:xfrm>
-            <a:off x="6019414" y="4935069"/>
-            <a:ext cx="591671" cy="1492624"/>
-          </a:xfrm>
-          <a:prstGeom prst="rect">
-            <a:avLst/>
-          </a:prstGeom>
-        </p:spPr>
-        <p:style>
-          <a:lnRef idx="2">
-            <a:schemeClr val="accent6">
-              <a:shade val="50000"/>
-            </a:schemeClr>
-          </a:lnRef>
-          <a:fillRef idx="1">
-            <a:schemeClr val="accent6"/>
-          </a:fillRef>
-          <a:effectRef idx="0">
-            <a:schemeClr val="accent6"/>
-          </a:effectRef>
-          <a:fontRef idx="minor">
-            <a:schemeClr val="lt1"/>
-          </a:fontRef>
-        </p:style>
-        <p:txBody>
-          <a:bodyPr rtlCol="0" anchor="ctr"/>
-          <a:lstStyle/>
-          <a:p>
-            <a:pPr algn="ctr"/>
-            <a:endParaRPr lang="es-AR"/>
-          </a:p>
-        </p:txBody>
-      </p:sp>
-      <p:sp>
-        <p:nvSpPr>
-          <p:cNvPr id="107" name="Rectangle 106"/>
-          <p:cNvSpPr/>
-          <p:nvPr/>
-        </p:nvSpPr>
-        <p:spPr>
-          <a:xfrm>
-            <a:off x="7600022" y="4128247"/>
-            <a:ext cx="591671" cy="2312893"/>
-          </a:xfrm>
-          <a:prstGeom prst="rect">
-            <a:avLst/>
-          </a:prstGeom>
-        </p:spPr>
-        <p:style>
-          <a:lnRef idx="2">
-            <a:schemeClr val="accent4">
-              <a:shade val="50000"/>
-            </a:schemeClr>
-          </a:lnRef>
-          <a:fillRef idx="1">
-            <a:schemeClr val="accent4"/>
-          </a:fillRef>
-          <a:effectRef idx="0">
-            <a:schemeClr val="accent4"/>
-          </a:effectRef>
-          <a:fontRef idx="minor">
-            <a:schemeClr val="lt1"/>
-          </a:fontRef>
-        </p:style>
-        <p:txBody>
-          <a:bodyPr rtlCol="0" anchor="ctr"/>
-          <a:lstStyle/>
-          <a:p>
-            <a:pPr algn="ctr"/>
-            <a:endParaRPr lang="es-AR"/>
-          </a:p>
-        </p:txBody>
-      </p:sp>
-      <p:sp>
-        <p:nvSpPr>
-          <p:cNvPr id="14" name="TextBox 13"/>
-          <p:cNvSpPr txBox="1"/>
-          <p:nvPr/>
-        </p:nvSpPr>
-        <p:spPr>
-          <a:xfrm rot="16200000">
-            <a:off x="1645798" y="4237172"/>
-            <a:ext cx="2196353" cy="369332"/>
-          </a:xfrm>
-          <a:prstGeom prst="rect">
-            <a:avLst/>
-          </a:prstGeom>
-          <a:noFill/>
-        </p:spPr>
-        <p:txBody>
-          <a:bodyPr wrap="square" rtlCol="0">
-            <a:spAutoFit/>
-          </a:bodyPr>
-          <a:lstStyle/>
-          <a:p>
-            <a:r>
-              <a:rPr lang="en-US" dirty="0" err="1" smtClean="0"/>
-              <a:t>Entradas</a:t>
-            </a:r>
-            <a:r>
-              <a:rPr lang="en-US" dirty="0" smtClean="0"/>
-              <a:t> </a:t>
-            </a:r>
-            <a:r>
-              <a:rPr lang="en-US" dirty="0" err="1" smtClean="0"/>
-              <a:t>vendidas</a:t>
-            </a:r>
-            <a:endParaRPr lang="es-AR" dirty="0"/>
-          </a:p>
-        </p:txBody>
-      </p:sp>
-      <p:sp>
-        <p:nvSpPr>
-          <p:cNvPr id="15" name="TextBox 14"/>
-          <p:cNvSpPr txBox="1"/>
-          <p:nvPr/>
-        </p:nvSpPr>
-        <p:spPr>
-          <a:xfrm>
-            <a:off x="3290048" y="3255046"/>
-            <a:ext cx="649940" cy="369332"/>
-          </a:xfrm>
-          <a:prstGeom prst="rect">
-            <a:avLst/>
-          </a:prstGeom>
-          <a:noFill/>
-        </p:spPr>
-        <p:txBody>
-          <a:bodyPr wrap="square" rtlCol="0">
-            <a:spAutoFit/>
-          </a:bodyPr>
-          <a:lstStyle/>
-          <a:p>
-            <a:r>
-              <a:rPr lang="en-US" dirty="0" smtClean="0"/>
-              <a:t>1000</a:t>
-            </a:r>
-            <a:endParaRPr lang="es-AR" dirty="0"/>
-          </a:p>
-        </p:txBody>
-      </p:sp>
-      <p:sp>
-        <p:nvSpPr>
-          <p:cNvPr id="108" name="TextBox 107"/>
-          <p:cNvSpPr txBox="1"/>
-          <p:nvPr/>
-        </p:nvSpPr>
-        <p:spPr>
-          <a:xfrm>
-            <a:off x="3301833" y="4668369"/>
-            <a:ext cx="649940" cy="369332"/>
-          </a:xfrm>
-          <a:prstGeom prst="rect">
-            <a:avLst/>
-          </a:prstGeom>
-          <a:noFill/>
-        </p:spPr>
-        <p:txBody>
-          <a:bodyPr wrap="square" rtlCol="0">
-            <a:spAutoFit/>
-          </a:bodyPr>
-          <a:lstStyle/>
-          <a:p>
-            <a:r>
-              <a:rPr lang="en-US" dirty="0" smtClean="0"/>
-              <a:t>500</a:t>
-            </a:r>
-            <a:endParaRPr lang="es-AR" dirty="0"/>
-          </a:p>
-        </p:txBody>
-      </p:sp>
-      <p:sp>
-        <p:nvSpPr>
-          <p:cNvPr id="109" name="TextBox 108"/>
-          <p:cNvSpPr txBox="1"/>
-          <p:nvPr/>
-        </p:nvSpPr>
-        <p:spPr>
-          <a:xfrm>
-            <a:off x="3290048" y="3961707"/>
-            <a:ext cx="649940" cy="369332"/>
-          </a:xfrm>
-          <a:prstGeom prst="rect">
-            <a:avLst/>
-          </a:prstGeom>
-          <a:noFill/>
-        </p:spPr>
-        <p:txBody>
-          <a:bodyPr wrap="square" rtlCol="0">
-            <a:spAutoFit/>
-          </a:bodyPr>
-          <a:lstStyle/>
-          <a:p>
-            <a:r>
-              <a:rPr lang="en-US" dirty="0" smtClean="0"/>
-              <a:t>700</a:t>
-            </a:r>
-            <a:endParaRPr lang="es-AR" dirty="0"/>
-          </a:p>
-        </p:txBody>
-      </p:sp>
-      <p:sp>
-        <p:nvSpPr>
-          <p:cNvPr id="110" name="TextBox 109"/>
-          <p:cNvSpPr txBox="1"/>
-          <p:nvPr/>
-        </p:nvSpPr>
-        <p:spPr>
-          <a:xfrm>
-            <a:off x="4343400" y="6459068"/>
-            <a:ext cx="793377" cy="369332"/>
-          </a:xfrm>
-          <a:prstGeom prst="rect">
-            <a:avLst/>
-          </a:prstGeom>
-          <a:noFill/>
-        </p:spPr>
-        <p:txBody>
-          <a:bodyPr wrap="square" rtlCol="0">
-            <a:spAutoFit/>
-          </a:bodyPr>
-          <a:lstStyle/>
-          <a:p>
-            <a:r>
-              <a:rPr lang="en-US" dirty="0" smtClean="0"/>
-              <a:t>22:20</a:t>
-            </a:r>
-            <a:endParaRPr lang="es-AR" dirty="0"/>
-          </a:p>
-        </p:txBody>
-      </p:sp>
-      <p:sp>
-        <p:nvSpPr>
-          <p:cNvPr id="111" name="TextBox 110"/>
-          <p:cNvSpPr txBox="1"/>
-          <p:nvPr/>
-        </p:nvSpPr>
-        <p:spPr>
-          <a:xfrm>
-            <a:off x="5945453" y="6435767"/>
-            <a:ext cx="793377" cy="369332"/>
-          </a:xfrm>
-          <a:prstGeom prst="rect">
-            <a:avLst/>
-          </a:prstGeom>
-          <a:noFill/>
-        </p:spPr>
-        <p:txBody>
-          <a:bodyPr wrap="square" rtlCol="0">
-            <a:spAutoFit/>
-          </a:bodyPr>
-          <a:lstStyle/>
-          <a:p>
-            <a:r>
-              <a:rPr lang="en-US" dirty="0" smtClean="0"/>
-              <a:t>15:10</a:t>
-            </a:r>
-            <a:endParaRPr lang="es-AR" dirty="0"/>
-          </a:p>
-        </p:txBody>
-      </p:sp>
-      <p:sp>
-        <p:nvSpPr>
-          <p:cNvPr id="112" name="TextBox 111"/>
-          <p:cNvSpPr txBox="1"/>
-          <p:nvPr/>
-        </p:nvSpPr>
-        <p:spPr>
-          <a:xfrm>
-            <a:off x="7547506" y="6459068"/>
-            <a:ext cx="793377" cy="369332"/>
-          </a:xfrm>
-          <a:prstGeom prst="rect">
-            <a:avLst/>
-          </a:prstGeom>
-          <a:noFill/>
-        </p:spPr>
-        <p:txBody>
-          <a:bodyPr wrap="square" rtlCol="0">
-            <a:spAutoFit/>
-          </a:bodyPr>
-          <a:lstStyle/>
-          <a:p>
-            <a:r>
-              <a:rPr lang="en-US" dirty="0" smtClean="0"/>
-              <a:t>10:30</a:t>
-            </a:r>
-            <a:endParaRPr lang="es-AR" dirty="0"/>
-          </a:p>
-        </p:txBody>
-      </p:sp>
+        </p:grpSpPr>
+        <p:cxnSp>
+          <p:nvCxnSpPr>
+            <p:cNvPr id="10" name="Straight Connector 9"/>
+            <p:cNvCxnSpPr/>
+            <p:nvPr/>
+          </p:nvCxnSpPr>
+          <p:spPr>
+            <a:xfrm>
+              <a:off x="3765177" y="6414246"/>
+              <a:ext cx="5916706" cy="26894"/>
+            </a:xfrm>
+            <a:prstGeom prst="line">
+              <a:avLst/>
+            </a:prstGeom>
+          </p:spPr>
+          <p:style>
+            <a:lnRef idx="1">
+              <a:schemeClr val="dk1"/>
+            </a:lnRef>
+            <a:fillRef idx="0">
+              <a:schemeClr val="dk1"/>
+            </a:fillRef>
+            <a:effectRef idx="0">
+              <a:schemeClr val="dk1"/>
+            </a:effectRef>
+            <a:fontRef idx="minor">
+              <a:schemeClr val="tx1"/>
+            </a:fontRef>
+          </p:style>
+        </p:cxnSp>
+        <p:cxnSp>
+          <p:nvCxnSpPr>
+            <p:cNvPr id="105" name="Straight Connector 104"/>
+            <p:cNvCxnSpPr/>
+            <p:nvPr/>
+          </p:nvCxnSpPr>
+          <p:spPr>
+            <a:xfrm flipV="1">
+              <a:off x="3917577" y="2770093"/>
+              <a:ext cx="22411" cy="3796553"/>
+            </a:xfrm>
+            <a:prstGeom prst="line">
+              <a:avLst/>
+            </a:prstGeom>
+          </p:spPr>
+          <p:style>
+            <a:lnRef idx="1">
+              <a:schemeClr val="dk1"/>
+            </a:lnRef>
+            <a:fillRef idx="0">
+              <a:schemeClr val="dk1"/>
+            </a:fillRef>
+            <a:effectRef idx="0">
+              <a:schemeClr val="dk1"/>
+            </a:effectRef>
+            <a:fontRef idx="minor">
+              <a:schemeClr val="tx1"/>
+            </a:fontRef>
+          </p:style>
+        </p:cxnSp>
+        <p:sp>
+          <p:nvSpPr>
+            <p:cNvPr id="12" name="Rectangle 11"/>
+            <p:cNvSpPr/>
+            <p:nvPr/>
+          </p:nvSpPr>
+          <p:spPr>
+            <a:xfrm>
+              <a:off x="4397188" y="3442446"/>
+              <a:ext cx="591671" cy="2985247"/>
+            </a:xfrm>
+            <a:prstGeom prst="rect">
+              <a:avLst/>
+            </a:prstGeom>
+          </p:spPr>
+          <p:style>
+            <a:lnRef idx="2">
+              <a:schemeClr val="accent1">
+                <a:shade val="50000"/>
+              </a:schemeClr>
+            </a:lnRef>
+            <a:fillRef idx="1">
+              <a:schemeClr val="accent1"/>
+            </a:fillRef>
+            <a:effectRef idx="0">
+              <a:schemeClr val="accent1"/>
+            </a:effectRef>
+            <a:fontRef idx="minor">
+              <a:schemeClr val="lt1"/>
+            </a:fontRef>
+          </p:style>
+          <p:txBody>
+            <a:bodyPr rtlCol="0" anchor="ctr"/>
+            <a:lstStyle/>
+            <a:p>
+              <a:pPr algn="ctr"/>
+              <a:endParaRPr lang="es-AR"/>
+            </a:p>
+          </p:txBody>
+        </p:sp>
+        <p:sp>
+          <p:nvSpPr>
+            <p:cNvPr id="106" name="Rectangle 105"/>
+            <p:cNvSpPr/>
+            <p:nvPr/>
+          </p:nvSpPr>
+          <p:spPr>
+            <a:xfrm>
+              <a:off x="6019414" y="4935069"/>
+              <a:ext cx="591671" cy="1492624"/>
+            </a:xfrm>
+            <a:prstGeom prst="rect">
+              <a:avLst/>
+            </a:prstGeom>
+          </p:spPr>
+          <p:style>
+            <a:lnRef idx="2">
+              <a:schemeClr val="accent6">
+                <a:shade val="50000"/>
+              </a:schemeClr>
+            </a:lnRef>
+            <a:fillRef idx="1">
+              <a:schemeClr val="accent6"/>
+            </a:fillRef>
+            <a:effectRef idx="0">
+              <a:schemeClr val="accent6"/>
+            </a:effectRef>
+            <a:fontRef idx="minor">
+              <a:schemeClr val="lt1"/>
+            </a:fontRef>
+          </p:style>
+          <p:txBody>
+            <a:bodyPr rtlCol="0" anchor="ctr"/>
+            <a:lstStyle/>
+            <a:p>
+              <a:pPr algn="ctr"/>
+              <a:endParaRPr lang="es-AR"/>
+            </a:p>
+          </p:txBody>
+        </p:sp>
+        <p:sp>
+          <p:nvSpPr>
+            <p:cNvPr id="107" name="Rectangle 106"/>
+            <p:cNvSpPr/>
+            <p:nvPr/>
+          </p:nvSpPr>
+          <p:spPr>
+            <a:xfrm>
+              <a:off x="7600022" y="4128247"/>
+              <a:ext cx="591671" cy="2312893"/>
+            </a:xfrm>
+            <a:prstGeom prst="rect">
+              <a:avLst/>
+            </a:prstGeom>
+          </p:spPr>
+          <p:style>
+            <a:lnRef idx="2">
+              <a:schemeClr val="accent4">
+                <a:shade val="50000"/>
+              </a:schemeClr>
+            </a:lnRef>
+            <a:fillRef idx="1">
+              <a:schemeClr val="accent4"/>
+            </a:fillRef>
+            <a:effectRef idx="0">
+              <a:schemeClr val="accent4"/>
+            </a:effectRef>
+            <a:fontRef idx="minor">
+              <a:schemeClr val="lt1"/>
+            </a:fontRef>
+          </p:style>
+          <p:txBody>
+            <a:bodyPr rtlCol="0" anchor="ctr"/>
+            <a:lstStyle/>
+            <a:p>
+              <a:pPr algn="ctr"/>
+              <a:endParaRPr lang="es-AR"/>
+            </a:p>
+          </p:txBody>
+        </p:sp>
+        <p:sp>
+          <p:nvSpPr>
+            <p:cNvPr id="14" name="TextBox 13"/>
+            <p:cNvSpPr txBox="1"/>
+            <p:nvPr/>
+          </p:nvSpPr>
+          <p:spPr>
+            <a:xfrm rot="16200000">
+              <a:off x="1645798" y="4237172"/>
+              <a:ext cx="2196353" cy="369332"/>
+            </a:xfrm>
+            <a:prstGeom prst="rect">
+              <a:avLst/>
+            </a:prstGeom>
+            <a:noFill/>
+          </p:spPr>
+          <p:txBody>
+            <a:bodyPr wrap="square" rtlCol="0">
+              <a:spAutoFit/>
+            </a:bodyPr>
+            <a:lstStyle/>
+            <a:p>
+              <a:r>
+                <a:rPr lang="en-US" dirty="0" err="1" smtClean="0"/>
+                <a:t>Entradas</a:t>
+              </a:r>
+              <a:r>
+                <a:rPr lang="en-US" dirty="0" smtClean="0"/>
+                <a:t> </a:t>
+              </a:r>
+              <a:r>
+                <a:rPr lang="en-US" dirty="0" err="1" smtClean="0"/>
+                <a:t>vendidas</a:t>
+              </a:r>
+              <a:endParaRPr lang="es-AR" dirty="0"/>
+            </a:p>
+          </p:txBody>
+        </p:sp>
+        <p:sp>
+          <p:nvSpPr>
+            <p:cNvPr id="15" name="TextBox 14"/>
+            <p:cNvSpPr txBox="1"/>
+            <p:nvPr/>
+          </p:nvSpPr>
+          <p:spPr>
+            <a:xfrm>
+              <a:off x="3290048" y="3255046"/>
+              <a:ext cx="649940" cy="369332"/>
+            </a:xfrm>
+            <a:prstGeom prst="rect">
+              <a:avLst/>
+            </a:prstGeom>
+            <a:noFill/>
+          </p:spPr>
+          <p:txBody>
+            <a:bodyPr wrap="square" rtlCol="0">
+              <a:spAutoFit/>
+            </a:bodyPr>
+            <a:lstStyle/>
+            <a:p>
+              <a:r>
+                <a:rPr lang="en-US" dirty="0" smtClean="0"/>
+                <a:t>1000</a:t>
+              </a:r>
+              <a:endParaRPr lang="es-AR" dirty="0"/>
+            </a:p>
+          </p:txBody>
+        </p:sp>
+        <p:sp>
+          <p:nvSpPr>
+            <p:cNvPr id="108" name="TextBox 107"/>
+            <p:cNvSpPr txBox="1"/>
+            <p:nvPr/>
+          </p:nvSpPr>
+          <p:spPr>
+            <a:xfrm>
+              <a:off x="3301833" y="4668369"/>
+              <a:ext cx="649940" cy="369332"/>
+            </a:xfrm>
+            <a:prstGeom prst="rect">
+              <a:avLst/>
+            </a:prstGeom>
+            <a:noFill/>
+          </p:spPr>
+          <p:txBody>
+            <a:bodyPr wrap="square" rtlCol="0">
+              <a:spAutoFit/>
+            </a:bodyPr>
+            <a:lstStyle/>
+            <a:p>
+              <a:r>
+                <a:rPr lang="en-US" dirty="0" smtClean="0"/>
+                <a:t>500</a:t>
+              </a:r>
+              <a:endParaRPr lang="es-AR" dirty="0"/>
+            </a:p>
+          </p:txBody>
+        </p:sp>
+        <p:sp>
+          <p:nvSpPr>
+            <p:cNvPr id="109" name="TextBox 108"/>
+            <p:cNvSpPr txBox="1"/>
+            <p:nvPr/>
+          </p:nvSpPr>
+          <p:spPr>
+            <a:xfrm>
+              <a:off x="3290048" y="3961707"/>
+              <a:ext cx="649940" cy="369332"/>
+            </a:xfrm>
+            <a:prstGeom prst="rect">
+              <a:avLst/>
+            </a:prstGeom>
+            <a:noFill/>
+          </p:spPr>
+          <p:txBody>
+            <a:bodyPr wrap="square" rtlCol="0">
+              <a:spAutoFit/>
+            </a:bodyPr>
+            <a:lstStyle/>
+            <a:p>
+              <a:r>
+                <a:rPr lang="en-US" dirty="0" smtClean="0"/>
+                <a:t>700</a:t>
+              </a:r>
+              <a:endParaRPr lang="es-AR" dirty="0"/>
+            </a:p>
+          </p:txBody>
+        </p:sp>
+        <p:sp>
+          <p:nvSpPr>
+            <p:cNvPr id="110" name="TextBox 109"/>
+            <p:cNvSpPr txBox="1"/>
+            <p:nvPr/>
+          </p:nvSpPr>
+          <p:spPr>
+            <a:xfrm>
+              <a:off x="4343400" y="6459068"/>
+              <a:ext cx="793377" cy="369332"/>
+            </a:xfrm>
+            <a:prstGeom prst="rect">
+              <a:avLst/>
+            </a:prstGeom>
+            <a:noFill/>
+          </p:spPr>
+          <p:txBody>
+            <a:bodyPr wrap="square" rtlCol="0">
+              <a:spAutoFit/>
+            </a:bodyPr>
+            <a:lstStyle/>
+            <a:p>
+              <a:r>
+                <a:rPr lang="en-US" dirty="0" smtClean="0"/>
+                <a:t>22:20</a:t>
+              </a:r>
+              <a:endParaRPr lang="es-AR" dirty="0"/>
+            </a:p>
+          </p:txBody>
+        </p:sp>
+        <p:sp>
+          <p:nvSpPr>
+            <p:cNvPr id="111" name="TextBox 110"/>
+            <p:cNvSpPr txBox="1"/>
+            <p:nvPr/>
+          </p:nvSpPr>
+          <p:spPr>
+            <a:xfrm>
+              <a:off x="5945453" y="6435767"/>
+              <a:ext cx="793377" cy="369332"/>
+            </a:xfrm>
+            <a:prstGeom prst="rect">
+              <a:avLst/>
+            </a:prstGeom>
+            <a:noFill/>
+          </p:spPr>
+          <p:txBody>
+            <a:bodyPr wrap="square" rtlCol="0">
+              <a:spAutoFit/>
+            </a:bodyPr>
+            <a:lstStyle/>
+            <a:p>
+              <a:r>
+                <a:rPr lang="en-US" dirty="0" smtClean="0"/>
+                <a:t>15:10</a:t>
+              </a:r>
+              <a:endParaRPr lang="es-AR" dirty="0"/>
+            </a:p>
+          </p:txBody>
+        </p:sp>
+        <p:sp>
+          <p:nvSpPr>
+            <p:cNvPr id="112" name="TextBox 111"/>
+            <p:cNvSpPr txBox="1"/>
+            <p:nvPr/>
+          </p:nvSpPr>
+          <p:spPr>
+            <a:xfrm>
+              <a:off x="7547506" y="6459068"/>
+              <a:ext cx="793377" cy="369332"/>
+            </a:xfrm>
+            <a:prstGeom prst="rect">
+              <a:avLst/>
+            </a:prstGeom>
+            <a:noFill/>
+          </p:spPr>
+          <p:txBody>
+            <a:bodyPr wrap="square" rtlCol="0">
+              <a:spAutoFit/>
+            </a:bodyPr>
+            <a:lstStyle/>
+            <a:p>
+              <a:r>
+                <a:rPr lang="en-US" dirty="0" smtClean="0"/>
+                <a:t>10:30</a:t>
+              </a:r>
+              <a:endParaRPr lang="es-AR" dirty="0"/>
+            </a:p>
+          </p:txBody>
+        </p:sp>
+      </p:grpSp>
     </p:spTree>
     <p:extLst>
       <p:ext uri="{BB962C8B-B14F-4D97-AF65-F5344CB8AC3E}">
@@ -7454,7 +7706,7 @@
 </p:sld>
 </file>
 
-<file path=ppt/slides/slide3.xml><?xml version="1.0" encoding="utf-8"?>
+<file path=ppt/slides/slide4.xml><?xml version="1.0" encoding="utf-8"?>
 <p:sld xmlns:a="http://schemas.openxmlformats.org/drawingml/2006/main" xmlns:r="http://schemas.openxmlformats.org/officeDocument/2006/relationships" xmlns:p="http://schemas.openxmlformats.org/presentationml/2006/main">
   <p:cSld>
     <p:spTree>
@@ -7911,13 +8163,13 @@
           <p:nvPr>
             <p:extLst>
               <p:ext uri="{D42A27DB-BD31-4B8C-83A1-F6EECF244321}">
-                <p14:modId xmlns:p14="http://schemas.microsoft.com/office/powerpoint/2010/main" val="2638424777"/>
+                <p14:modId xmlns:p14="http://schemas.microsoft.com/office/powerpoint/2010/main" val="2659080552"/>
               </p:ext>
             </p:extLst>
           </p:nvPr>
         </p:nvGraphicFramePr>
         <p:xfrm>
-          <a:off x="2032001" y="1046759"/>
+          <a:off x="2032001" y="5130032"/>
           <a:ext cx="8127999" cy="1478280"/>
         </p:xfrm>
         <a:graphic>
@@ -8202,13 +8454,13 @@
           <p:nvPr>
             <p:extLst>
               <p:ext uri="{D42A27DB-BD31-4B8C-83A1-F6EECF244321}">
-                <p14:modId xmlns:p14="http://schemas.microsoft.com/office/powerpoint/2010/main" val="3587033164"/>
+                <p14:modId xmlns:p14="http://schemas.microsoft.com/office/powerpoint/2010/main" val="3726961794"/>
               </p:ext>
             </p:extLst>
           </p:nvPr>
         </p:nvGraphicFramePr>
         <p:xfrm>
-          <a:off x="3309773" y="2816909"/>
+          <a:off x="3247465" y="976371"/>
           <a:ext cx="5627594" cy="3751730"/>
         </p:xfrm>
         <a:graphic>

</xml_diff>